<commit_message>
added link to intro
</commit_message>
<xml_diff>
--- a/assets/ppt/lex/lex2-regular-expressions.pptx
+++ b/assets/ppt/lex/lex2-regular-expressions.pptx
@@ -15712,8 +15712,8 @@
           </a:p>
         </p:txBody>
       </p:sp>
-      <mc:AlternateContent xmlns:mc="http://schemas.openxmlformats.org/markup-compatibility/2006">
-        <mc:Choice xmlns:a14="http://schemas.microsoft.com/office/drawing/2010/main" Requires="a14">
+      <mc:AlternateContent xmlns:mc="http://schemas.openxmlformats.org/markup-compatibility/2006" xmlns:a14="http://schemas.microsoft.com/office/drawing/2010/main">
+        <mc:Choice Requires="a14">
           <p:sp>
             <p:nvSpPr>
               <p:cNvPr id="156" name="Shape 156"/>
@@ -16598,7 +16598,7 @@
             </p:txBody>
           </p:sp>
         </mc:Choice>
-        <mc:Fallback>
+        <mc:Fallback xmlns="">
           <p:sp>
             <p:nvSpPr>
               <p:cNvPr id="156" name="Shape 156"/>
@@ -16847,11 +16847,7 @@
                 </a:r>
               </a:p>
               <a:p>
-                <a:pPr lvl="1" indent="-214313">
-                  <a:lnSpc>
-                    <a:spcPct val="90000"/>
-                  </a:lnSpc>
-                </a:pPr>
+                <a:pPr lvl="1" indent="-214313"/>
                 <a:r>
                   <a:rPr lang="en-US" dirty="0"/>
                   <a:t>L(</a:t>
@@ -16869,6 +16865,85 @@
                 </a:r>
                 <a14:m>
                   <m:oMath xmlns:m="http://schemas.openxmlformats.org/officeDocument/2006/math">
+                    <m:d>
+                      <m:dPr>
+                        <m:begChr m:val="{"/>
+                        <m:endChr m:val="}"/>
+                        <m:ctrlPr>
+                          <a:rPr lang="en-US" i="1" dirty="0">
+                            <a:solidFill>
+                              <a:schemeClr val="accent2"/>
+                            </a:solidFill>
+                            <a:latin typeface="Cambria Math" panose="02040503050406030204" pitchFamily="18" charset="0"/>
+                          </a:rPr>
+                        </m:ctrlPr>
+                      </m:dPr>
+                      <m:e>
+                        <m:r>
+                          <a:rPr lang="en-US" i="1" dirty="0">
+                            <a:solidFill>
+                              <a:schemeClr val="accent2"/>
+                            </a:solidFill>
+                            <a:latin typeface="Cambria Math" panose="02040503050406030204" pitchFamily="18" charset="0"/>
+                          </a:rPr>
+                          <m:t>𝑎</m:t>
+                        </m:r>
+                        <m:r>
+                          <a:rPr lang="en-US" i="1" baseline="30000" dirty="0">
+                            <a:solidFill>
+                              <a:schemeClr val="accent2"/>
+                            </a:solidFill>
+                            <a:latin typeface="Cambria Math" panose="02040503050406030204" pitchFamily="18" charset="0"/>
+                          </a:rPr>
+                          <m:t>𝑛</m:t>
+                        </m:r>
+                        <m:r>
+                          <a:rPr lang="en-US" i="1" dirty="0">
+                            <a:solidFill>
+                              <a:schemeClr val="accent2"/>
+                            </a:solidFill>
+                            <a:latin typeface="Cambria Math" panose="02040503050406030204" pitchFamily="18" charset="0"/>
+                          </a:rPr>
+                          <m:t> :</m:t>
+                        </m:r>
+                        <m:r>
+                          <a:rPr lang="en-US" i="1" dirty="0">
+                            <a:solidFill>
+                              <a:schemeClr val="accent2"/>
+                            </a:solidFill>
+                            <a:latin typeface="Cambria Math" panose="02040503050406030204" pitchFamily="18" charset="0"/>
+                          </a:rPr>
+                          <m:t>𝑛</m:t>
+                        </m:r>
+                        <m:r>
+                          <a:rPr lang="en-US" b="0" i="1" dirty="0" smtClean="0">
+                            <a:solidFill>
+                              <a:schemeClr val="accent2"/>
+                            </a:solidFill>
+                            <a:latin typeface="Cambria Math" panose="02040503050406030204" pitchFamily="18" charset="0"/>
+                          </a:rPr>
+                          <m:t>≥</m:t>
+                        </m:r>
+                        <m:r>
+                          <a:rPr lang="en-US" i="1" dirty="0">
+                            <a:solidFill>
+                              <a:schemeClr val="accent2"/>
+                            </a:solidFill>
+                            <a:latin typeface="Cambria Math" panose="02040503050406030204" pitchFamily="18" charset="0"/>
+                          </a:rPr>
+                          <m:t>0</m:t>
+                        </m:r>
+                      </m:e>
+                    </m:d>
+                    <m:r>
+                      <a:rPr lang="en-US" b="0" i="1" dirty="0" smtClean="0">
+                        <a:solidFill>
+                          <a:schemeClr val="accent2"/>
+                        </a:solidFill>
+                        <a:latin typeface="Cambria Math" panose="02040503050406030204" pitchFamily="18" charset="0"/>
+                      </a:rPr>
+                      <m:t>=</m:t>
+                    </m:r>
                     <m:r>
                       <a:rPr lang="en-US" i="1" dirty="0" smtClean="0">
                         <a:solidFill>
@@ -17406,16 +17481,7 @@
                         </a:solidFill>
                         <a:latin typeface="Cambria Math" panose="02040503050406030204" pitchFamily="18" charset="0"/>
                       </a:rPr>
-                      <m:t>),</m:t>
-                    </m:r>
-                    <m:r>
-                      <a:rPr lang="en-US" i="1" dirty="0">
-                        <a:solidFill>
-                          <a:srgbClr val="FF0000"/>
-                        </a:solidFill>
-                        <a:latin typeface="Cambria Math" panose="02040503050406030204" pitchFamily="18" charset="0"/>
-                      </a:rPr>
-                      <m:t> </m:t>
+                      <m:t>), </m:t>
                     </m:r>
                     <m:r>
                       <a:rPr lang="en-US" b="0" i="1" dirty="0" smtClean="0">
@@ -20969,8 +21035,8 @@
           </a:p>
         </p:txBody>
       </p:sp>
-      <mc:AlternateContent xmlns:mc="http://schemas.openxmlformats.org/markup-compatibility/2006">
-        <mc:Choice xmlns:a14="http://schemas.microsoft.com/office/drawing/2010/main" Requires="a14">
+      <mc:AlternateContent xmlns:mc="http://schemas.openxmlformats.org/markup-compatibility/2006" xmlns:a14="http://schemas.microsoft.com/office/drawing/2010/main">
+        <mc:Choice Requires="a14">
           <p:graphicFrame>
             <p:nvGraphicFramePr>
               <p:cNvPr id="309383" name="Group 135"/>
@@ -27441,7 +27507,7 @@
             </a:graphic>
           </p:graphicFrame>
         </mc:Choice>
-        <mc:Fallback>
+        <mc:Fallback xmlns="">
           <p:graphicFrame>
             <p:nvGraphicFramePr>
               <p:cNvPr id="309383" name="Group 135"/>

</xml_diff>

<commit_message>
week 2 of lexical analysis
</commit_message>
<xml_diff>
--- a/assets/ppt/lex/lex2-regular-expressions.pptx
+++ b/assets/ppt/lex/lex2-regular-expressions.pptx
@@ -2568,7 +2568,7 @@
           <a:p>
             <a:fld id="{1B6DC762-1116-2146-A47C-D79A5A5DBAFD}" type="datetime1">
               <a:rPr lang="en-CA" smtClean="0"/>
-              <a:t>2020-09-13</a:t>
+              <a:t>2020-09-16</a:t>
             </a:fld>
             <a:endParaRPr lang="en-US"/>
           </a:p>
@@ -2766,7 +2766,7 @@
           <a:p>
             <a:fld id="{725FEDD1-5A1B-2342-BAF0-F7C5511A73CE}" type="datetime1">
               <a:rPr lang="en-CA" smtClean="0"/>
-              <a:t>2020-09-13</a:t>
+              <a:t>2020-09-16</a:t>
             </a:fld>
             <a:endParaRPr lang="en-US"/>
           </a:p>
@@ -2974,7 +2974,7 @@
           <a:p>
             <a:fld id="{F09E59AE-0AE1-4048-8BD6-D39FC0EBB194}" type="datetime1">
               <a:rPr lang="en-CA" smtClean="0"/>
-              <a:t>2020-09-13</a:t>
+              <a:t>2020-09-16</a:t>
             </a:fld>
             <a:endParaRPr lang="en-US"/>
           </a:p>
@@ -3324,7 +3324,7 @@
           <a:p>
             <a:fld id="{A2849525-9B7D-5945-A782-775278635E42}" type="datetime1">
               <a:rPr lang="en-CA" smtClean="0"/>
-              <a:t>2020-09-13</a:t>
+              <a:t>2020-09-16</a:t>
             </a:fld>
             <a:endParaRPr lang="en-US"/>
           </a:p>
@@ -3599,7 +3599,7 @@
           <a:p>
             <a:fld id="{D05E1499-BDD1-6940-8C79-13A8B8E63D57}" type="datetime1">
               <a:rPr lang="en-CA" smtClean="0"/>
-              <a:t>2020-09-13</a:t>
+              <a:t>2020-09-16</a:t>
             </a:fld>
             <a:endParaRPr lang="en-US"/>
           </a:p>
@@ -3864,7 +3864,7 @@
           <a:p>
             <a:fld id="{17E70EF3-18A7-4644-8DA2-1EB9CA66C736}" type="datetime1">
               <a:rPr lang="en-CA" smtClean="0"/>
-              <a:t>2020-09-13</a:t>
+              <a:t>2020-09-16</a:t>
             </a:fld>
             <a:endParaRPr lang="en-US"/>
           </a:p>
@@ -4276,7 +4276,7 @@
           <a:p>
             <a:fld id="{54538FC1-2481-FB4A-91E5-87F3422DE2D5}" type="datetime1">
               <a:rPr lang="en-CA" smtClean="0"/>
-              <a:t>2020-09-13</a:t>
+              <a:t>2020-09-16</a:t>
             </a:fld>
             <a:endParaRPr lang="en-US"/>
           </a:p>
@@ -4417,7 +4417,7 @@
           <a:p>
             <a:fld id="{93D5C515-1622-C840-89B2-A4A55D34866A}" type="datetime1">
               <a:rPr lang="en-CA" smtClean="0"/>
-              <a:t>2020-09-13</a:t>
+              <a:t>2020-09-16</a:t>
             </a:fld>
             <a:endParaRPr lang="en-US"/>
           </a:p>
@@ -4530,7 +4530,7 @@
           <a:p>
             <a:fld id="{B9077E75-6C88-BB47-AC6F-0DCA859E7113}" type="datetime1">
               <a:rPr lang="en-CA" smtClean="0"/>
-              <a:t>2020-09-13</a:t>
+              <a:t>2020-09-16</a:t>
             </a:fld>
             <a:endParaRPr lang="en-US"/>
           </a:p>
@@ -4841,7 +4841,7 @@
           <a:p>
             <a:fld id="{1AD12F8B-7E05-A047-BAC3-EE71BEBBE5BE}" type="datetime1">
               <a:rPr lang="en-CA" smtClean="0"/>
-              <a:t>2020-09-13</a:t>
+              <a:t>2020-09-16</a:t>
             </a:fld>
             <a:endParaRPr lang="en-US"/>
           </a:p>
@@ -5129,7 +5129,7 @@
           <a:p>
             <a:fld id="{C1D9F72A-E93E-B546-8268-6408A6E1DA62}" type="datetime1">
               <a:rPr lang="en-CA" smtClean="0"/>
-              <a:t>2020-09-13</a:t>
+              <a:t>2020-09-16</a:t>
             </a:fld>
             <a:endParaRPr lang="en-US"/>
           </a:p>
@@ -5370,7 +5370,7 @@
           <a:p>
             <a:fld id="{97DF4AC7-DB73-7444-A2A7-FD79FE1A2B2B}" type="datetime1">
               <a:rPr lang="en-CA" smtClean="0"/>
-              <a:t>2020-09-13</a:t>
+              <a:t>2020-09-16</a:t>
             </a:fld>
             <a:endParaRPr lang="en-US"/>
           </a:p>
@@ -15307,6 +15307,72 @@
           </p:sp>
         </mc:Fallback>
       </mc:AlternateContent>
+      <p:sp>
+        <p:nvSpPr>
+          <p:cNvPr id="16" name="Rectangular Callout 15">
+            <a:extLst>
+              <a:ext uri="{FF2B5EF4-FFF2-40B4-BE49-F238E27FC236}">
+                <a16:creationId xmlns:a16="http://schemas.microsoft.com/office/drawing/2014/main" id="{6DB781D0-45E5-CB49-97F5-49D3F8AEAFD4}"/>
+              </a:ext>
+            </a:extLst>
+          </p:cNvPr>
+          <p:cNvSpPr/>
+          <p:nvPr/>
+        </p:nvSpPr>
+        <p:spPr>
+          <a:xfrm>
+            <a:off x="5922533" y="1263413"/>
+            <a:ext cx="2592817" cy="804289"/>
+          </a:xfrm>
+          <a:prstGeom prst="wedgeRectCallout">
+            <a:avLst>
+              <a:gd name="adj1" fmla="val -59474"/>
+              <a:gd name="adj2" fmla="val -3991"/>
+            </a:avLst>
+          </a:prstGeom>
+        </p:spPr>
+        <p:style>
+          <a:lnRef idx="2">
+            <a:schemeClr val="accent1">
+              <a:shade val="50000"/>
+            </a:schemeClr>
+          </a:lnRef>
+          <a:fillRef idx="1">
+            <a:schemeClr val="accent1"/>
+          </a:fillRef>
+          <a:effectRef idx="0">
+            <a:schemeClr val="accent1"/>
+          </a:effectRef>
+          <a:fontRef idx="minor">
+            <a:schemeClr val="lt1"/>
+          </a:fontRef>
+        </p:style>
+        <p:txBody>
+          <a:bodyPr rtlCol="0" anchor="ctr"/>
+          <a:lstStyle/>
+          <a:p>
+            <a:r>
+              <a:rPr lang="en-US" sz="1400" dirty="0"/>
+              <a:t>Q: Provide the list of tokens for the input </a:t>
+            </a:r>
+            <a:r>
+              <a:rPr lang="en-US" sz="1400" dirty="0">
+                <a:latin typeface="Consolas" panose="020B0609020204030204" pitchFamily="49" charset="0"/>
+                <a:cs typeface="Consolas" panose="020B0609020204030204" pitchFamily="49" charset="0"/>
+              </a:rPr>
+              <a:t>1double1</a:t>
+            </a:r>
+            <a:r>
+              <a:rPr lang="en-US" sz="1400" dirty="0"/>
+              <a:t> (using the token definitions from slide 10)</a:t>
+            </a:r>
+            <a:endParaRPr lang="en-US" sz="1400" dirty="0">
+              <a:latin typeface="Consolas" panose="020B0609020204030204" pitchFamily="49" charset="0"/>
+              <a:cs typeface="Consolas" panose="020B0609020204030204" pitchFamily="49" charset="0"/>
+            </a:endParaRPr>
+          </a:p>
+        </p:txBody>
+      </p:sp>
     </p:spTree>
     <p:extLst>
       <p:ext uri="{BB962C8B-B14F-4D97-AF65-F5344CB8AC3E}">
@@ -15370,6 +15436,51 @@
                       </p:childTnLst>
                     </p:cTn>
                   </p:par>
+                  <p:par>
+                    <p:cTn id="7" fill="hold">
+                      <p:stCondLst>
+                        <p:cond delay="indefinite"/>
+                      </p:stCondLst>
+                      <p:childTnLst>
+                        <p:par>
+                          <p:cTn id="8" fill="hold">
+                            <p:stCondLst>
+                              <p:cond delay="0"/>
+                            </p:stCondLst>
+                            <p:childTnLst>
+                              <p:par>
+                                <p:cTn id="9" presetID="1" presetClass="entr" presetSubtype="0" fill="hold" grpId="0" nodeType="clickEffect">
+                                  <p:stCondLst>
+                                    <p:cond delay="0"/>
+                                  </p:stCondLst>
+                                  <p:childTnLst>
+                                    <p:set>
+                                      <p:cBhvr>
+                                        <p:cTn id="10" dur="1" fill="hold">
+                                          <p:stCondLst>
+                                            <p:cond delay="0"/>
+                                          </p:stCondLst>
+                                        </p:cTn>
+                                        <p:tgtEl>
+                                          <p:spTgt spid="16"/>
+                                        </p:tgtEl>
+                                        <p:attrNameLst>
+                                          <p:attrName>style.visibility</p:attrName>
+                                        </p:attrNameLst>
+                                      </p:cBhvr>
+                                      <p:to>
+                                        <p:strVal val="visible"/>
+                                      </p:to>
+                                    </p:set>
+                                  </p:childTnLst>
+                                </p:cTn>
+                              </p:par>
+                            </p:childTnLst>
+                          </p:cTn>
+                        </p:par>
+                      </p:childTnLst>
+                    </p:cTn>
+                  </p:par>
                 </p:childTnLst>
               </p:cTn>
               <p:prevCondLst>
@@ -15393,6 +15504,7 @@
     </p:tnLst>
     <p:bldLst>
       <p:bldP spid="3" grpId="0" animBg="1"/>
+      <p:bldP spid="16" grpId="0" animBg="1"/>
     </p:bldLst>
   </p:timing>
 </p:sld>
@@ -16761,8 +16873,8 @@
           </a:p>
         </p:txBody>
       </p:sp>
-      <mc:AlternateContent xmlns:mc="http://schemas.openxmlformats.org/markup-compatibility/2006">
-        <mc:Choice xmlns:a14="http://schemas.microsoft.com/office/drawing/2010/main" Requires="a14">
+      <mc:AlternateContent xmlns:mc="http://schemas.openxmlformats.org/markup-compatibility/2006" xmlns:a14="http://schemas.microsoft.com/office/drawing/2010/main">
+        <mc:Choice Requires="a14">
           <p:sp>
             <p:nvSpPr>
               <p:cNvPr id="163" name="Shape 163"/>
@@ -18205,7 +18317,7 @@
             </p:txBody>
           </p:sp>
         </mc:Choice>
-        <mc:Fallback>
+        <mc:Fallback xmlns="">
           <p:sp>
             <p:nvSpPr>
               <p:cNvPr id="163" name="Shape 163"/>

</xml_diff>